<commit_message>
add multi api key support
</commit_message>
<xml_diff>
--- a/images.pptx
+++ b/images.pptx
@@ -6,6 +6,7 @@
   </p:sldMasterIdLst>
   <p:sldIdLst>
     <p:sldId id="256" r:id="rId2"/>
+    <p:sldId id="257" r:id="rId3"/>
   </p:sldIdLst>
   <p:sldSz cx="12192000" cy="6858000"/>
   <p:notesSz cx="6858000" cy="9144000"/>
@@ -124,20 +125,6 @@
 </p:cmAuthorLst>
 </file>
 
-<file path=ppt/comments/comment1.xml><?xml version="1.0" encoding="utf-8"?>
-<p:cmLst xmlns:a="http://schemas.openxmlformats.org/drawingml/2006/main" xmlns:r="http://schemas.openxmlformats.org/officeDocument/2006/relationships" xmlns:p="http://schemas.openxmlformats.org/presentationml/2006/main">
-  <p:cm authorId="1" dt="2021-07-18T14:42:45.138" idx="1">
-    <p:pos x="10" y="10"/>
-    <p:text/>
-    <p:extLst>
-      <p:ext uri="{C676402C-5697-4E1C-873F-D02D1690AC5C}">
-        <p15:threadingInfo xmlns:p15="http://schemas.microsoft.com/office/powerpoint/2012/main" timeZoneBias="-120"/>
-      </p:ext>
-    </p:extLst>
-  </p:cm>
-</p:cmLst>
-</file>
-
 <file path=ppt/slideLayouts/slideLayout1.xml><?xml version="1.0" encoding="utf-8"?>
 <p:sldLayout xmlns:a="http://schemas.openxmlformats.org/drawingml/2006/main" xmlns:r="http://schemas.openxmlformats.org/officeDocument/2006/relationships" xmlns:p="http://schemas.openxmlformats.org/presentationml/2006/main" type="title" preserve="1">
   <p:cSld name="Titelfolie">
@@ -285,7 +272,7 @@
           <a:p>
             <a:fld id="{80F91CA9-D1EC-4DC4-87E0-69668074F1F9}" type="datetimeFigureOut">
               <a:rPr lang="de-DE" smtClean="0"/>
-              <a:t>18.07.2021</a:t>
+              <a:t>08.08.2021</a:t>
             </a:fld>
             <a:endParaRPr lang="de-DE"/>
           </a:p>
@@ -483,7 +470,7 @@
           <a:p>
             <a:fld id="{80F91CA9-D1EC-4DC4-87E0-69668074F1F9}" type="datetimeFigureOut">
               <a:rPr lang="de-DE" smtClean="0"/>
-              <a:t>18.07.2021</a:t>
+              <a:t>08.08.2021</a:t>
             </a:fld>
             <a:endParaRPr lang="de-DE"/>
           </a:p>
@@ -691,7 +678,7 @@
           <a:p>
             <a:fld id="{80F91CA9-D1EC-4DC4-87E0-69668074F1F9}" type="datetimeFigureOut">
               <a:rPr lang="de-DE" smtClean="0"/>
-              <a:t>18.07.2021</a:t>
+              <a:t>08.08.2021</a:t>
             </a:fld>
             <a:endParaRPr lang="de-DE"/>
           </a:p>
@@ -889,7 +876,7 @@
           <a:p>
             <a:fld id="{80F91CA9-D1EC-4DC4-87E0-69668074F1F9}" type="datetimeFigureOut">
               <a:rPr lang="de-DE" smtClean="0"/>
-              <a:t>18.07.2021</a:t>
+              <a:t>08.08.2021</a:t>
             </a:fld>
             <a:endParaRPr lang="de-DE"/>
           </a:p>
@@ -1164,7 +1151,7 @@
           <a:p>
             <a:fld id="{80F91CA9-D1EC-4DC4-87E0-69668074F1F9}" type="datetimeFigureOut">
               <a:rPr lang="de-DE" smtClean="0"/>
-              <a:t>18.07.2021</a:t>
+              <a:t>08.08.2021</a:t>
             </a:fld>
             <a:endParaRPr lang="de-DE"/>
           </a:p>
@@ -1429,7 +1416,7 @@
           <a:p>
             <a:fld id="{80F91CA9-D1EC-4DC4-87E0-69668074F1F9}" type="datetimeFigureOut">
               <a:rPr lang="de-DE" smtClean="0"/>
-              <a:t>18.07.2021</a:t>
+              <a:t>08.08.2021</a:t>
             </a:fld>
             <a:endParaRPr lang="de-DE"/>
           </a:p>
@@ -1841,7 +1828,7 @@
           <a:p>
             <a:fld id="{80F91CA9-D1EC-4DC4-87E0-69668074F1F9}" type="datetimeFigureOut">
               <a:rPr lang="de-DE" smtClean="0"/>
-              <a:t>18.07.2021</a:t>
+              <a:t>08.08.2021</a:t>
             </a:fld>
             <a:endParaRPr lang="de-DE"/>
           </a:p>
@@ -1982,7 +1969,7 @@
           <a:p>
             <a:fld id="{80F91CA9-D1EC-4DC4-87E0-69668074F1F9}" type="datetimeFigureOut">
               <a:rPr lang="de-DE" smtClean="0"/>
-              <a:t>18.07.2021</a:t>
+              <a:t>08.08.2021</a:t>
             </a:fld>
             <a:endParaRPr lang="de-DE"/>
           </a:p>
@@ -2095,7 +2082,7 @@
           <a:p>
             <a:fld id="{80F91CA9-D1EC-4DC4-87E0-69668074F1F9}" type="datetimeFigureOut">
               <a:rPr lang="de-DE" smtClean="0"/>
-              <a:t>18.07.2021</a:t>
+              <a:t>08.08.2021</a:t>
             </a:fld>
             <a:endParaRPr lang="de-DE"/>
           </a:p>
@@ -2406,7 +2393,7 @@
           <a:p>
             <a:fld id="{80F91CA9-D1EC-4DC4-87E0-69668074F1F9}" type="datetimeFigureOut">
               <a:rPr lang="de-DE" smtClean="0"/>
-              <a:t>18.07.2021</a:t>
+              <a:t>08.08.2021</a:t>
             </a:fld>
             <a:endParaRPr lang="de-DE"/>
           </a:p>
@@ -2694,7 +2681,7 @@
           <a:p>
             <a:fld id="{80F91CA9-D1EC-4DC4-87E0-69668074F1F9}" type="datetimeFigureOut">
               <a:rPr lang="de-DE" smtClean="0"/>
-              <a:t>18.07.2021</a:t>
+              <a:t>08.08.2021</a:t>
             </a:fld>
             <a:endParaRPr lang="de-DE"/>
           </a:p>
@@ -2935,7 +2922,7 @@
           <a:p>
             <a:fld id="{80F91CA9-D1EC-4DC4-87E0-69668074F1F9}" type="datetimeFigureOut">
               <a:rPr lang="de-DE" smtClean="0"/>
-              <a:t>18.07.2021</a:t>
+              <a:t>08.08.2021</a:t>
             </a:fld>
             <a:endParaRPr lang="de-DE"/>
           </a:p>
@@ -3354,10 +3341,10 @@
       </p:grpSpPr>
       <p:pic>
         <p:nvPicPr>
-          <p:cNvPr id="5" name="Grafik 4">
-            <a:extLst>
-              <a:ext uri="{FF2B5EF4-FFF2-40B4-BE49-F238E27FC236}">
-                <a16:creationId xmlns:a16="http://schemas.microsoft.com/office/drawing/2014/main" id="{B220406F-C255-4A99-BC00-F8AD214DCF36}"/>
+          <p:cNvPr id="16" name="Grafik 15">
+            <a:extLst>
+              <a:ext uri="{FF2B5EF4-FFF2-40B4-BE49-F238E27FC236}">
+                <a16:creationId xmlns:a16="http://schemas.microsoft.com/office/drawing/2014/main" id="{1A2F2B62-6097-4FD6-B5E5-4B5006DDB750}"/>
               </a:ext>
             </a:extLst>
           </p:cNvPr>
@@ -3374,8 +3361,8 @@
         </p:blipFill>
         <p:spPr>
           <a:xfrm>
-            <a:off x="5691524" y="2298095"/>
-            <a:ext cx="3171825" cy="1562100"/>
+            <a:off x="2806214" y="3429000"/>
+            <a:ext cx="4686954" cy="2829320"/>
           </a:xfrm>
           <a:prstGeom prst="rect">
             <a:avLst/>
@@ -3384,57 +3371,40 @@
       </p:pic>
       <p:pic>
         <p:nvPicPr>
-          <p:cNvPr id="1026" name="Picture 2" descr="Enter API key &#10;Reset &#10;Kills &#10;Deaths &#10;lose ">
-            <a:extLst>
-              <a:ext uri="{FF2B5EF4-FFF2-40B4-BE49-F238E27FC236}">
-                <a16:creationId xmlns:a16="http://schemas.microsoft.com/office/drawing/2014/main" id="{FD0D4BC7-AB71-47D1-9407-ADD04D42E366}"/>
+          <p:cNvPr id="18" name="Grafik 17">
+            <a:extLst>
+              <a:ext uri="{FF2B5EF4-FFF2-40B4-BE49-F238E27FC236}">
+                <a16:creationId xmlns:a16="http://schemas.microsoft.com/office/drawing/2014/main" id="{3FA90F99-BF1F-4331-BE9E-0F5E70B64B9C}"/>
               </a:ext>
             </a:extLst>
           </p:cNvPr>
           <p:cNvPicPr>
-            <a:picLocks noChangeAspect="1" noChangeArrowheads="1"/>
+            <a:picLocks noChangeAspect="1"/>
           </p:cNvPicPr>
           <p:nvPr/>
         </p:nvPicPr>
         <p:blipFill>
-          <a:blip r:embed="rId3">
-            <a:extLst>
-              <a:ext uri="{28A0092B-C50C-407E-A947-70E740481C1C}">
-                <a14:useLocalDpi xmlns:a14="http://schemas.microsoft.com/office/drawing/2010/main" val="0"/>
-              </a:ext>
-            </a:extLst>
-          </a:blip>
-          <a:srcRect/>
+          <a:blip r:embed="rId3"/>
           <a:stretch>
             <a:fillRect/>
           </a:stretch>
         </p:blipFill>
-        <p:spPr bwMode="auto">
+        <p:spPr>
           <a:xfrm>
-            <a:off x="1270576" y="728662"/>
-            <a:ext cx="2562225" cy="1800225"/>
+            <a:off x="2406108" y="551825"/>
+            <a:ext cx="5087060" cy="2876951"/>
           </a:xfrm>
           <a:prstGeom prst="rect">
             <a:avLst/>
           </a:prstGeom>
-          <a:noFill/>
-          <a:extLst>
-            <a:ext uri="{909E8E84-426E-40DD-AFC4-6F175D3DCCD1}">
-              <a14:hiddenFill xmlns:a14="http://schemas.microsoft.com/office/drawing/2010/main">
-                <a:solidFill>
-                  <a:srgbClr val="FFFFFF"/>
-                </a:solidFill>
-              </a14:hiddenFill>
-            </a:ext>
-          </a:extLst>
         </p:spPr>
       </p:pic>
       <p:sp>
         <p:nvSpPr>
-          <p:cNvPr id="7" name="Legende: Linie 6">
-            <a:extLst>
-              <a:ext uri="{FF2B5EF4-FFF2-40B4-BE49-F238E27FC236}">
-                <a16:creationId xmlns:a16="http://schemas.microsoft.com/office/drawing/2014/main" id="{C0570FC4-3B82-4829-9631-88CE6D2E30CE}"/>
+          <p:cNvPr id="21" name="Legende: Linie 20">
+            <a:extLst>
+              <a:ext uri="{FF2B5EF4-FFF2-40B4-BE49-F238E27FC236}">
+                <a16:creationId xmlns:a16="http://schemas.microsoft.com/office/drawing/2014/main" id="{E507E303-C809-4B35-B5B8-4C9EF19E0979}"/>
               </a:ext>
             </a:extLst>
           </p:cNvPr>
@@ -3443,7 +3413,181 @@
         </p:nvSpPr>
         <p:spPr>
           <a:xfrm>
-            <a:off x="7758261" y="3291560"/>
+            <a:off x="3296214" y="1990300"/>
+            <a:ext cx="720522" cy="320512"/>
+          </a:xfrm>
+          <a:prstGeom prst="borderCallout1">
+            <a:avLst>
+              <a:gd name="adj1" fmla="val 102715"/>
+              <a:gd name="adj2" fmla="val 49115"/>
+              <a:gd name="adj3" fmla="val 220890"/>
+              <a:gd name="adj4" fmla="val 115136"/>
+            </a:avLst>
+          </a:prstGeom>
+          <a:ln w="38100">
+            <a:solidFill>
+              <a:srgbClr val="FF0000"/>
+            </a:solidFill>
+          </a:ln>
+        </p:spPr>
+        <p:style>
+          <a:lnRef idx="2">
+            <a:schemeClr val="accent2"/>
+          </a:lnRef>
+          <a:fillRef idx="1">
+            <a:schemeClr val="lt1"/>
+          </a:fillRef>
+          <a:effectRef idx="0">
+            <a:schemeClr val="accent2"/>
+          </a:effectRef>
+          <a:fontRef idx="minor">
+            <a:schemeClr val="dk1"/>
+          </a:fontRef>
+        </p:style>
+        <p:txBody>
+          <a:bodyPr rtlCol="0" anchor="ctr"/>
+          <a:lstStyle/>
+          <a:p>
+            <a:pPr algn="ctr"/>
+            <a:r>
+              <a:rPr lang="de-DE" dirty="0"/>
+              <a:t>100%</a:t>
+            </a:r>
+          </a:p>
+        </p:txBody>
+      </p:sp>
+      <p:sp>
+        <p:nvSpPr>
+          <p:cNvPr id="22" name="Legende: Linie 21">
+            <a:extLst>
+              <a:ext uri="{FF2B5EF4-FFF2-40B4-BE49-F238E27FC236}">
+                <a16:creationId xmlns:a16="http://schemas.microsoft.com/office/drawing/2014/main" id="{30CA7BB1-5704-408D-8A5B-52EF89DC0103}"/>
+              </a:ext>
+            </a:extLst>
+          </p:cNvPr>
+          <p:cNvSpPr/>
+          <p:nvPr/>
+        </p:nvSpPr>
+        <p:spPr>
+          <a:xfrm>
+            <a:off x="3296214" y="4523148"/>
+            <a:ext cx="720522" cy="320512"/>
+          </a:xfrm>
+          <a:prstGeom prst="borderCallout1">
+            <a:avLst>
+              <a:gd name="adj1" fmla="val 102715"/>
+              <a:gd name="adj2" fmla="val 49115"/>
+              <a:gd name="adj3" fmla="val 253141"/>
+              <a:gd name="adj4" fmla="val 116240"/>
+            </a:avLst>
+          </a:prstGeom>
+          <a:ln w="38100">
+            <a:solidFill>
+              <a:srgbClr val="FF0000"/>
+            </a:solidFill>
+          </a:ln>
+        </p:spPr>
+        <p:style>
+          <a:lnRef idx="2">
+            <a:schemeClr val="accent2"/>
+          </a:lnRef>
+          <a:fillRef idx="1">
+            <a:schemeClr val="lt1"/>
+          </a:fillRef>
+          <a:effectRef idx="0">
+            <a:schemeClr val="accent2"/>
+          </a:effectRef>
+          <a:fontRef idx="minor">
+            <a:schemeClr val="dk1"/>
+          </a:fontRef>
+        </p:style>
+        <p:txBody>
+          <a:bodyPr rtlCol="0" anchor="ctr"/>
+          <a:lstStyle/>
+          <a:p>
+            <a:pPr algn="ctr"/>
+            <a:r>
+              <a:rPr lang="de-DE" dirty="0"/>
+              <a:t>500%</a:t>
+            </a:r>
+          </a:p>
+        </p:txBody>
+      </p:sp>
+    </p:spTree>
+    <p:extLst>
+      <p:ext uri="{BB962C8B-B14F-4D97-AF65-F5344CB8AC3E}">
+        <p14:creationId xmlns:p14="http://schemas.microsoft.com/office/powerpoint/2010/main" val="2594357890"/>
+      </p:ext>
+    </p:extLst>
+  </p:cSld>
+  <p:clrMapOvr>
+    <a:masterClrMapping/>
+  </p:clrMapOvr>
+</p:sld>
+</file>
+
+<file path=ppt/slides/slide2.xml><?xml version="1.0" encoding="utf-8"?>
+<p:sld xmlns:a="http://schemas.openxmlformats.org/drawingml/2006/main" xmlns:r="http://schemas.openxmlformats.org/officeDocument/2006/relationships" xmlns:p="http://schemas.openxmlformats.org/presentationml/2006/main">
+  <p:cSld>
+    <p:spTree>
+      <p:nvGrpSpPr>
+        <p:cNvPr id="1" name=""/>
+        <p:cNvGrpSpPr/>
+        <p:nvPr/>
+      </p:nvGrpSpPr>
+      <p:grpSpPr>
+        <a:xfrm>
+          <a:off x="0" y="0"/>
+          <a:ext cx="0" cy="0"/>
+          <a:chOff x="0" y="0"/>
+          <a:chExt cx="0" cy="0"/>
+        </a:xfrm>
+      </p:grpSpPr>
+      <p:pic>
+        <p:nvPicPr>
+          <p:cNvPr id="4" name="Grafik 3">
+            <a:extLst>
+              <a:ext uri="{FF2B5EF4-FFF2-40B4-BE49-F238E27FC236}">
+                <a16:creationId xmlns:a16="http://schemas.microsoft.com/office/drawing/2014/main" id="{5BA7824C-5D68-42D3-B00E-3687B9E46FAE}"/>
+              </a:ext>
+            </a:extLst>
+          </p:cNvPr>
+          <p:cNvPicPr>
+            <a:picLocks noChangeAspect="1"/>
+          </p:cNvPicPr>
+          <p:nvPr/>
+        </p:nvPicPr>
+        <p:blipFill>
+          <a:blip r:embed="rId2"/>
+          <a:stretch>
+            <a:fillRect/>
+          </a:stretch>
+        </p:blipFill>
+        <p:spPr>
+          <a:xfrm>
+            <a:off x="3926335" y="2242435"/>
+            <a:ext cx="3171825" cy="1562100"/>
+          </a:xfrm>
+          <a:prstGeom prst="rect">
+            <a:avLst/>
+          </a:prstGeom>
+        </p:spPr>
+      </p:pic>
+      <p:sp>
+        <p:nvSpPr>
+          <p:cNvPr id="5" name="Legende: Linie 4">
+            <a:extLst>
+              <a:ext uri="{FF2B5EF4-FFF2-40B4-BE49-F238E27FC236}">
+                <a16:creationId xmlns:a16="http://schemas.microsoft.com/office/drawing/2014/main" id="{4201CFC5-D408-4B28-B241-9D50E14EA43F}"/>
+              </a:ext>
+            </a:extLst>
+          </p:cNvPr>
+          <p:cNvSpPr/>
+          <p:nvPr/>
+        </p:nvSpPr>
+        <p:spPr>
+          <a:xfrm>
+            <a:off x="5993072" y="3235900"/>
             <a:ext cx="725863" cy="251594"/>
           </a:xfrm>
           <a:prstGeom prst="borderCallout1">
@@ -3488,10 +3632,10 @@
       </p:sp>
       <p:sp>
         <p:nvSpPr>
-          <p:cNvPr id="11" name="Legende: Linie 10">
-            <a:extLst>
-              <a:ext uri="{FF2B5EF4-FFF2-40B4-BE49-F238E27FC236}">
-                <a16:creationId xmlns:a16="http://schemas.microsoft.com/office/drawing/2014/main" id="{57031687-FBDB-4159-BFD7-30DC9480F33F}"/>
+          <p:cNvPr id="6" name="Legende: Linie 5">
+            <a:extLst>
+              <a:ext uri="{FF2B5EF4-FFF2-40B4-BE49-F238E27FC236}">
+                <a16:creationId xmlns:a16="http://schemas.microsoft.com/office/drawing/2014/main" id="{EED59227-3A80-4EEF-867F-C82AE2EBD2EF}"/>
               </a:ext>
             </a:extLst>
           </p:cNvPr>
@@ -3500,7 +3644,7 @@
         </p:nvSpPr>
         <p:spPr>
           <a:xfrm>
-            <a:off x="5809875" y="3543154"/>
+            <a:off x="4044686" y="3487494"/>
             <a:ext cx="846841" cy="251594"/>
           </a:xfrm>
           <a:prstGeom prst="borderCallout1">
@@ -3546,10 +3690,10 @@
       </p:sp>
       <p:sp>
         <p:nvSpPr>
-          <p:cNvPr id="13" name="Legende: Linie 12">
-            <a:extLst>
-              <a:ext uri="{FF2B5EF4-FFF2-40B4-BE49-F238E27FC236}">
-                <a16:creationId xmlns:a16="http://schemas.microsoft.com/office/drawing/2014/main" id="{CC64B3B0-C3FA-41E2-91CE-EA1A0B413E54}"/>
+          <p:cNvPr id="7" name="Legende: Linie 6">
+            <a:extLst>
+              <a:ext uri="{FF2B5EF4-FFF2-40B4-BE49-F238E27FC236}">
+                <a16:creationId xmlns:a16="http://schemas.microsoft.com/office/drawing/2014/main" id="{4F89E87F-F2C9-487D-B6F4-E9B16AB6486C}"/>
               </a:ext>
             </a:extLst>
           </p:cNvPr>
@@ -3558,7 +3702,7 @@
         </p:nvSpPr>
         <p:spPr>
           <a:xfrm>
-            <a:off x="6051430" y="3229256"/>
+            <a:off x="4286241" y="3173596"/>
             <a:ext cx="604152" cy="251594"/>
           </a:xfrm>
           <a:prstGeom prst="borderCallout1">
@@ -3603,10 +3747,10 @@
       </p:sp>
       <p:sp>
         <p:nvSpPr>
-          <p:cNvPr id="14" name="Legende: Linie 13">
-            <a:extLst>
-              <a:ext uri="{FF2B5EF4-FFF2-40B4-BE49-F238E27FC236}">
-                <a16:creationId xmlns:a16="http://schemas.microsoft.com/office/drawing/2014/main" id="{DBB3706E-B70D-41FF-957B-290D36087DDF}"/>
+          <p:cNvPr id="8" name="Legende: Linie 7">
+            <a:extLst>
+              <a:ext uri="{FF2B5EF4-FFF2-40B4-BE49-F238E27FC236}">
+                <a16:creationId xmlns:a16="http://schemas.microsoft.com/office/drawing/2014/main" id="{4E9ECF91-35D1-4079-85EF-6FF85D1974B2}"/>
               </a:ext>
             </a:extLst>
           </p:cNvPr>
@@ -3615,7 +3759,7 @@
         </p:nvSpPr>
         <p:spPr>
           <a:xfrm>
-            <a:off x="6578776" y="2474316"/>
+            <a:off x="4813587" y="2418656"/>
             <a:ext cx="1491701" cy="320512"/>
           </a:xfrm>
           <a:prstGeom prst="borderCallout1">
@@ -3665,10 +3809,10 @@
       </p:sp>
       <p:sp>
         <p:nvSpPr>
-          <p:cNvPr id="15" name="Legende: Linie 14">
-            <a:extLst>
-              <a:ext uri="{FF2B5EF4-FFF2-40B4-BE49-F238E27FC236}">
-                <a16:creationId xmlns:a16="http://schemas.microsoft.com/office/drawing/2014/main" id="{F11D4C0F-0B57-4FB9-A887-9C14C0BADEDA}"/>
+          <p:cNvPr id="9" name="Legende: Linie 8">
+            <a:extLst>
+              <a:ext uri="{FF2B5EF4-FFF2-40B4-BE49-F238E27FC236}">
+                <a16:creationId xmlns:a16="http://schemas.microsoft.com/office/drawing/2014/main" id="{227A1AB7-C6AF-46F9-8CB8-BF7322508F24}"/>
               </a:ext>
             </a:extLst>
           </p:cNvPr>
@@ -3677,7 +3821,7 @@
         </p:nvSpPr>
         <p:spPr>
           <a:xfrm>
-            <a:off x="5909094" y="2857132"/>
+            <a:off x="4143905" y="2801472"/>
             <a:ext cx="746488" cy="251594"/>
           </a:xfrm>
           <a:prstGeom prst="borderCallout1">
@@ -3721,100 +3865,10 @@
           </a:p>
         </p:txBody>
       </p:sp>
-      <p:pic>
-        <p:nvPicPr>
-          <p:cNvPr id="3" name="Grafik 2">
-            <a:extLst>
-              <a:ext uri="{FF2B5EF4-FFF2-40B4-BE49-F238E27FC236}">
-                <a16:creationId xmlns:a16="http://schemas.microsoft.com/office/drawing/2014/main" id="{53F54BB0-4299-44AC-8ACC-8D795FAB5448}"/>
-              </a:ext>
-            </a:extLst>
-          </p:cNvPr>
-          <p:cNvPicPr>
-            <a:picLocks noChangeAspect="1"/>
-          </p:cNvPicPr>
-          <p:nvPr/>
-        </p:nvPicPr>
-        <p:blipFill>
-          <a:blip r:embed="rId2"/>
-          <a:stretch>
-            <a:fillRect/>
-          </a:stretch>
-        </p:blipFill>
-        <p:spPr>
-          <a:xfrm>
-            <a:off x="311932" y="2647950"/>
-            <a:ext cx="3171825" cy="1562100"/>
-          </a:xfrm>
-          <a:prstGeom prst="rect">
-            <a:avLst/>
-          </a:prstGeom>
-        </p:spPr>
-      </p:pic>
-      <p:pic>
-        <p:nvPicPr>
-          <p:cNvPr id="6" name="Grafik 5">
-            <a:extLst>
-              <a:ext uri="{FF2B5EF4-FFF2-40B4-BE49-F238E27FC236}">
-                <a16:creationId xmlns:a16="http://schemas.microsoft.com/office/drawing/2014/main" id="{71BBD300-988C-4CF5-9208-52F24DD9A623}"/>
-              </a:ext>
-            </a:extLst>
-          </p:cNvPr>
-          <p:cNvPicPr>
-            <a:picLocks noChangeAspect="1"/>
-          </p:cNvPicPr>
-          <p:nvPr/>
-        </p:nvPicPr>
-        <p:blipFill>
-          <a:blip r:embed="rId4"/>
-          <a:stretch>
-            <a:fillRect/>
-          </a:stretch>
-        </p:blipFill>
-        <p:spPr>
-          <a:xfrm>
-            <a:off x="890208" y="4576763"/>
-            <a:ext cx="2724150" cy="1552575"/>
-          </a:xfrm>
-          <a:prstGeom prst="rect">
-            <a:avLst/>
-          </a:prstGeom>
-        </p:spPr>
-      </p:pic>
-      <p:pic>
-        <p:nvPicPr>
-          <p:cNvPr id="9" name="Grafik 8">
-            <a:extLst>
-              <a:ext uri="{FF2B5EF4-FFF2-40B4-BE49-F238E27FC236}">
-                <a16:creationId xmlns:a16="http://schemas.microsoft.com/office/drawing/2014/main" id="{EB32BA37-D60D-4DF3-8AF5-AAB6845261A6}"/>
-              </a:ext>
-            </a:extLst>
-          </p:cNvPr>
-          <p:cNvPicPr>
-            <a:picLocks noChangeAspect="1"/>
-          </p:cNvPicPr>
-          <p:nvPr/>
-        </p:nvPicPr>
-        <p:blipFill>
-          <a:blip r:embed="rId5"/>
-          <a:stretch>
-            <a:fillRect/>
-          </a:stretch>
-        </p:blipFill>
-        <p:spPr>
-          <a:xfrm>
-            <a:off x="4045554" y="5224738"/>
-            <a:ext cx="1171575" cy="895350"/>
-          </a:xfrm>
-          <a:prstGeom prst="rect">
-            <a:avLst/>
-          </a:prstGeom>
-        </p:spPr>
-      </p:pic>
     </p:spTree>
     <p:extLst>
       <p:ext uri="{BB962C8B-B14F-4D97-AF65-F5344CB8AC3E}">
-        <p14:creationId xmlns:p14="http://schemas.microsoft.com/office/powerpoint/2010/main" val="2594357890"/>
+        <p14:creationId xmlns:p14="http://schemas.microsoft.com/office/powerpoint/2010/main" val="3648465113"/>
       </p:ext>
     </p:extLst>
   </p:cSld>

</xml_diff>